<commit_message>
kmeans segmentation results and visualizations
</commit_message>
<xml_diff>
--- a/Power BI Report/Dashboard Layout.pptx
+++ b/Power BI Report/Dashboard Layout.pptx
@@ -244,7 +244,7 @@
           <a:p>
             <a:fld id="{7A2C6692-EA0D-4861-862E-DDC209ABBD47}" type="datetimeFigureOut">
               <a:rPr lang="en-US" smtClean="0"/>
-              <a:t>10/17/2025</a:t>
+              <a:t>10/19/2025</a:t>
             </a:fld>
             <a:endParaRPr lang="en-US"/>
           </a:p>
@@ -414,7 +414,7 @@
           <a:p>
             <a:fld id="{7A2C6692-EA0D-4861-862E-DDC209ABBD47}" type="datetimeFigureOut">
               <a:rPr lang="en-US" smtClean="0"/>
-              <a:t>10/17/2025</a:t>
+              <a:t>10/19/2025</a:t>
             </a:fld>
             <a:endParaRPr lang="en-US"/>
           </a:p>
@@ -594,7 +594,7 @@
           <a:p>
             <a:fld id="{7A2C6692-EA0D-4861-862E-DDC209ABBD47}" type="datetimeFigureOut">
               <a:rPr lang="en-US" smtClean="0"/>
-              <a:t>10/17/2025</a:t>
+              <a:t>10/19/2025</a:t>
             </a:fld>
             <a:endParaRPr lang="en-US"/>
           </a:p>
@@ -764,7 +764,7 @@
           <a:p>
             <a:fld id="{7A2C6692-EA0D-4861-862E-DDC209ABBD47}" type="datetimeFigureOut">
               <a:rPr lang="en-US" smtClean="0"/>
-              <a:t>10/17/2025</a:t>
+              <a:t>10/19/2025</a:t>
             </a:fld>
             <a:endParaRPr lang="en-US"/>
           </a:p>
@@ -1010,7 +1010,7 @@
           <a:p>
             <a:fld id="{7A2C6692-EA0D-4861-862E-DDC209ABBD47}" type="datetimeFigureOut">
               <a:rPr lang="en-US" smtClean="0"/>
-              <a:t>10/17/2025</a:t>
+              <a:t>10/19/2025</a:t>
             </a:fld>
             <a:endParaRPr lang="en-US"/>
           </a:p>
@@ -1242,7 +1242,7 @@
           <a:p>
             <a:fld id="{7A2C6692-EA0D-4861-862E-DDC209ABBD47}" type="datetimeFigureOut">
               <a:rPr lang="en-US" smtClean="0"/>
-              <a:t>10/17/2025</a:t>
+              <a:t>10/19/2025</a:t>
             </a:fld>
             <a:endParaRPr lang="en-US"/>
           </a:p>
@@ -1609,7 +1609,7 @@
           <a:p>
             <a:fld id="{7A2C6692-EA0D-4861-862E-DDC209ABBD47}" type="datetimeFigureOut">
               <a:rPr lang="en-US" smtClean="0"/>
-              <a:t>10/17/2025</a:t>
+              <a:t>10/19/2025</a:t>
             </a:fld>
             <a:endParaRPr lang="en-US"/>
           </a:p>
@@ -1727,7 +1727,7 @@
           <a:p>
             <a:fld id="{7A2C6692-EA0D-4861-862E-DDC209ABBD47}" type="datetimeFigureOut">
               <a:rPr lang="en-US" smtClean="0"/>
-              <a:t>10/17/2025</a:t>
+              <a:t>10/19/2025</a:t>
             </a:fld>
             <a:endParaRPr lang="en-US"/>
           </a:p>
@@ -1822,7 +1822,7 @@
           <a:p>
             <a:fld id="{7A2C6692-EA0D-4861-862E-DDC209ABBD47}" type="datetimeFigureOut">
               <a:rPr lang="en-US" smtClean="0"/>
-              <a:t>10/17/2025</a:t>
+              <a:t>10/19/2025</a:t>
             </a:fld>
             <a:endParaRPr lang="en-US"/>
           </a:p>
@@ -2099,7 +2099,7 @@
           <a:p>
             <a:fld id="{7A2C6692-EA0D-4861-862E-DDC209ABBD47}" type="datetimeFigureOut">
               <a:rPr lang="en-US" smtClean="0"/>
-              <a:t>10/17/2025</a:t>
+              <a:t>10/19/2025</a:t>
             </a:fld>
             <a:endParaRPr lang="en-US"/>
           </a:p>
@@ -2356,7 +2356,7 @@
           <a:p>
             <a:fld id="{7A2C6692-EA0D-4861-862E-DDC209ABBD47}" type="datetimeFigureOut">
               <a:rPr lang="en-US" smtClean="0"/>
-              <a:t>10/17/2025</a:t>
+              <a:t>10/19/2025</a:t>
             </a:fld>
             <a:endParaRPr lang="en-US"/>
           </a:p>
@@ -2569,7 +2569,7 @@
           <a:p>
             <a:fld id="{7A2C6692-EA0D-4861-862E-DDC209ABBD47}" type="datetimeFigureOut">
               <a:rPr lang="en-US" smtClean="0"/>
-              <a:t>10/17/2025</a:t>
+              <a:t>10/19/2025</a:t>
             </a:fld>
             <a:endParaRPr lang="en-US"/>
           </a:p>
@@ -4257,10 +4257,10 @@
       </p:sp>
       <p:sp>
         <p:nvSpPr>
-          <p:cNvPr id="16" name="Rectangle: Rounded Corners 15">
+          <p:cNvPr id="18" name="Rectangle: Rounded Corners 17">
             <a:extLst>
               <a:ext uri="{FF2B5EF4-FFF2-40B4-BE49-F238E27FC236}">
-                <a16:creationId xmlns:a16="http://schemas.microsoft.com/office/drawing/2014/main" id="{33A32737-D20A-ED23-693E-C62AB8913CE3}"/>
+                <a16:creationId xmlns:a16="http://schemas.microsoft.com/office/drawing/2014/main" id="{EAF2E494-E3B9-ACC2-797D-CF932C0C30D1}"/>
               </a:ext>
             </a:extLst>
           </p:cNvPr>
@@ -4271,12 +4271,12 @@
         </p:nvSpPr>
         <p:spPr>
           <a:xfrm>
-            <a:off x="2694357" y="1393035"/>
-            <a:ext cx="5266614" cy="7339481"/>
+            <a:off x="8385488" y="1393036"/>
+            <a:ext cx="8258786" cy="2645564"/>
           </a:xfrm>
           <a:prstGeom prst="roundRect">
             <a:avLst>
-              <a:gd name="adj" fmla="val 4246"/>
+              <a:gd name="adj" fmla="val 2037"/>
             </a:avLst>
           </a:prstGeom>
           <a:solidFill>
@@ -4291,6 +4291,7 @@
                 <a:alpha val="10000"/>
               </a:srgbClr>
             </a:outerShdw>
+            <a:softEdge rad="0"/>
           </a:effectLst>
         </p:spPr>
         <p:style>
@@ -4324,57 +4325,74 @@
           </a:p>
         </p:txBody>
       </p:sp>
-      <p:cxnSp>
-        <p:nvCxnSpPr>
-          <p:cNvPr id="8" name="Straight Arrow Connector 7">
+      <p:sp>
+        <p:nvSpPr>
+          <p:cNvPr id="19" name="Rectangle 18" hidden="1">
             <a:extLst>
               <a:ext uri="{FF2B5EF4-FFF2-40B4-BE49-F238E27FC236}">
-                <a16:creationId xmlns:a16="http://schemas.microsoft.com/office/drawing/2014/main" id="{DE85CCF1-E8FB-FB87-5802-2541254A1DD7}"/>
+                <a16:creationId xmlns:a16="http://schemas.microsoft.com/office/drawing/2014/main" id="{FD0C806B-82B3-DEAB-C2F8-313624EA9529}"/>
               </a:ext>
             </a:extLst>
           </p:cNvPr>
-          <p:cNvCxnSpPr>
-            <a:cxnSpLocks/>
-          </p:cNvCxnSpPr>
+          <p:cNvSpPr>
+            <a:spLocks/>
+          </p:cNvSpPr>
           <p:nvPr/>
-        </p:nvCxnSpPr>
-        <p:spPr>
-          <a:xfrm flipH="1">
-            <a:off x="2961558" y="3351550"/>
-            <a:ext cx="4732211" cy="0"/>
-          </a:xfrm>
-          <a:prstGeom prst="straightConnector1">
+        </p:nvSpPr>
+        <p:spPr>
+          <a:xfrm>
+            <a:off x="7994921" y="0"/>
+            <a:ext cx="356616" cy="9144000"/>
+          </a:xfrm>
+          <a:prstGeom prst="rect">
             <a:avLst/>
           </a:prstGeom>
-          <a:ln w="25400">
+          <a:solidFill>
+            <a:srgbClr val="C00000"/>
+          </a:solidFill>
+          <a:ln>
             <a:solidFill>
-              <a:schemeClr val="bg1">
-                <a:lumMod val="85000"/>
-              </a:schemeClr>
+              <a:schemeClr val="tx1"/>
             </a:solidFill>
           </a:ln>
         </p:spPr>
         <p:style>
           <a:lnRef idx="2">
-            <a:schemeClr val="accent1"/>
+            <a:schemeClr val="accent1">
+              <a:shade val="15000"/>
+            </a:schemeClr>
           </a:lnRef>
-          <a:fillRef idx="0">
+          <a:fillRef idx="1">
             <a:schemeClr val="accent1"/>
           </a:fillRef>
-          <a:effectRef idx="1">
+          <a:effectRef idx="0">
             <a:schemeClr val="accent1"/>
           </a:effectRef>
           <a:fontRef idx="minor">
-            <a:schemeClr val="tx1"/>
+            <a:schemeClr val="lt1"/>
           </a:fontRef>
         </p:style>
-      </p:cxnSp>
-      <p:sp>
-        <p:nvSpPr>
-          <p:cNvPr id="18" name="Rectangle: Rounded Corners 17">
+        <p:txBody>
+          <a:bodyPr rtlCol="0" anchor="ctr"/>
+          <a:lstStyle/>
+          <a:p>
+            <a:endParaRPr lang="en-US" sz="3200" b="1">
+              <a:solidFill>
+                <a:schemeClr val="tx1"/>
+              </a:solidFill>
+              <a:latin typeface="Segoe UI Variable Text" pitchFamily="2" charset="0"/>
+              <a:ea typeface="Segoe UI Black" panose="020B0A02040204020203" pitchFamily="34" charset="0"/>
+              <a:cs typeface="Segoe UI Semibold" panose="020B0702040204020203" pitchFamily="34" charset="0"/>
+            </a:endParaRPr>
+          </a:p>
+        </p:txBody>
+      </p:sp>
+      <p:sp>
+        <p:nvSpPr>
+          <p:cNvPr id="39" name="Rectangle 38" hidden="1">
             <a:extLst>
               <a:ext uri="{FF2B5EF4-FFF2-40B4-BE49-F238E27FC236}">
-                <a16:creationId xmlns:a16="http://schemas.microsoft.com/office/drawing/2014/main" id="{EAF2E494-E3B9-ACC2-797D-CF932C0C30D1}"/>
+                <a16:creationId xmlns:a16="http://schemas.microsoft.com/office/drawing/2014/main" id="{869A89D8-FE3D-EE6C-68C0-ACE2B031CE05}"/>
               </a:ext>
             </a:extLst>
           </p:cNvPr>
@@ -4385,8 +4403,204 @@
         </p:nvSpPr>
         <p:spPr>
           <a:xfrm>
-            <a:off x="8385488" y="1393036"/>
-            <a:ext cx="3632341" cy="7339480"/>
+            <a:off x="12056609" y="0"/>
+            <a:ext cx="356616" cy="9144000"/>
+          </a:xfrm>
+          <a:prstGeom prst="rect">
+            <a:avLst/>
+          </a:prstGeom>
+          <a:solidFill>
+            <a:srgbClr val="C00000"/>
+          </a:solidFill>
+          <a:ln>
+            <a:solidFill>
+              <a:schemeClr val="tx1"/>
+            </a:solidFill>
+          </a:ln>
+        </p:spPr>
+        <p:style>
+          <a:lnRef idx="2">
+            <a:schemeClr val="accent1">
+              <a:shade val="15000"/>
+            </a:schemeClr>
+          </a:lnRef>
+          <a:fillRef idx="1">
+            <a:schemeClr val="accent1"/>
+          </a:fillRef>
+          <a:effectRef idx="0">
+            <a:schemeClr val="accent1"/>
+          </a:effectRef>
+          <a:fontRef idx="minor">
+            <a:schemeClr val="lt1"/>
+          </a:fontRef>
+        </p:style>
+        <p:txBody>
+          <a:bodyPr rtlCol="0" anchor="ctr"/>
+          <a:lstStyle/>
+          <a:p>
+            <a:endParaRPr lang="en-US" sz="3200" b="1">
+              <a:solidFill>
+                <a:schemeClr val="tx1"/>
+              </a:solidFill>
+              <a:latin typeface="Segoe UI Variable Text" pitchFamily="2" charset="0"/>
+              <a:ea typeface="Segoe UI Black" panose="020B0A02040204020203" pitchFamily="34" charset="0"/>
+              <a:cs typeface="Segoe UI Semibold" panose="020B0702040204020203" pitchFamily="34" charset="0"/>
+            </a:endParaRPr>
+          </a:p>
+        </p:txBody>
+      </p:sp>
+      <p:sp>
+        <p:nvSpPr>
+          <p:cNvPr id="3" name="Rectangle: Rounded Corners 2">
+            <a:extLst>
+              <a:ext uri="{FF2B5EF4-FFF2-40B4-BE49-F238E27FC236}">
+                <a16:creationId xmlns:a16="http://schemas.microsoft.com/office/drawing/2014/main" id="{8C0D8FAD-C655-3AC5-3289-6291B2470D66}"/>
+              </a:ext>
+            </a:extLst>
+          </p:cNvPr>
+          <p:cNvSpPr>
+            <a:spLocks/>
+          </p:cNvSpPr>
+          <p:nvPr/>
+        </p:nvSpPr>
+        <p:spPr>
+          <a:xfrm>
+            <a:off x="2694357" y="1393036"/>
+            <a:ext cx="5256953" cy="7339480"/>
+          </a:xfrm>
+          <a:prstGeom prst="roundRect">
+            <a:avLst>
+              <a:gd name="adj" fmla="val 2037"/>
+            </a:avLst>
+          </a:prstGeom>
+          <a:solidFill>
+            <a:schemeClr val="bg1"/>
+          </a:solidFill>
+          <a:ln>
+            <a:noFill/>
+          </a:ln>
+          <a:effectLst>
+            <a:outerShdw blurRad="50800" dist="50800" dir="5400000" sx="102000" sy="102000" algn="ctr" rotWithShape="0">
+              <a:srgbClr val="000000">
+                <a:alpha val="10000"/>
+              </a:srgbClr>
+            </a:outerShdw>
+            <a:softEdge rad="0"/>
+          </a:effectLst>
+        </p:spPr>
+        <p:style>
+          <a:lnRef idx="2">
+            <a:schemeClr val="accent1">
+              <a:shade val="15000"/>
+            </a:schemeClr>
+          </a:lnRef>
+          <a:fillRef idx="1">
+            <a:schemeClr val="accent1"/>
+          </a:fillRef>
+          <a:effectRef idx="0">
+            <a:schemeClr val="accent1"/>
+          </a:effectRef>
+          <a:fontRef idx="minor">
+            <a:schemeClr val="lt1"/>
+          </a:fontRef>
+        </p:style>
+        <p:txBody>
+          <a:bodyPr rtlCol="0" anchor="ctr"/>
+          <a:lstStyle/>
+          <a:p>
+            <a:endParaRPr lang="en-US" sz="3200" b="1">
+              <a:solidFill>
+                <a:schemeClr val="tx1"/>
+              </a:solidFill>
+              <a:latin typeface="Segoe UI Variable Text" pitchFamily="2" charset="0"/>
+              <a:ea typeface="Segoe UI Black" panose="020B0A02040204020203" pitchFamily="34" charset="0"/>
+              <a:cs typeface="Segoe UI Semibold" panose="020B0702040204020203" pitchFamily="34" charset="0"/>
+            </a:endParaRPr>
+          </a:p>
+        </p:txBody>
+      </p:sp>
+      <p:sp>
+        <p:nvSpPr>
+          <p:cNvPr id="40" name="Rectangle 39">
+            <a:extLst>
+              <a:ext uri="{FF2B5EF4-FFF2-40B4-BE49-F238E27FC236}">
+                <a16:creationId xmlns:a16="http://schemas.microsoft.com/office/drawing/2014/main" id="{D7892DCC-7549-B044-3D30-C3B66FC5FA54}"/>
+              </a:ext>
+            </a:extLst>
+          </p:cNvPr>
+          <p:cNvSpPr/>
+          <p:nvPr/>
+        </p:nvSpPr>
+        <p:spPr>
+          <a:xfrm>
+            <a:off x="2961558" y="1393035"/>
+            <a:ext cx="4989753" cy="566394"/>
+          </a:xfrm>
+          <a:prstGeom prst="rect">
+            <a:avLst/>
+          </a:prstGeom>
+          <a:noFill/>
+          <a:ln>
+            <a:noFill/>
+          </a:ln>
+        </p:spPr>
+        <p:style>
+          <a:lnRef idx="2">
+            <a:schemeClr val="accent1">
+              <a:shade val="15000"/>
+            </a:schemeClr>
+          </a:lnRef>
+          <a:fillRef idx="1">
+            <a:schemeClr val="accent1"/>
+          </a:fillRef>
+          <a:effectRef idx="0">
+            <a:schemeClr val="accent1"/>
+          </a:effectRef>
+          <a:fontRef idx="minor">
+            <a:schemeClr val="lt1"/>
+          </a:fontRef>
+        </p:style>
+        <p:txBody>
+          <a:bodyPr rtlCol="0" anchor="ctr"/>
+          <a:lstStyle/>
+          <a:p>
+            <a:pPr>
+              <a:lnSpc>
+                <a:spcPts val="3000"/>
+              </a:lnSpc>
+            </a:pPr>
+            <a:r>
+              <a:rPr lang="en-US" b="1" dirty="0">
+                <a:solidFill>
+                  <a:schemeClr val="tx1"/>
+                </a:solidFill>
+                <a:latin typeface="Segoe UI Variable Display Semib" pitchFamily="2" charset="0"/>
+                <a:ea typeface="Segoe UI Black" panose="020B0A02040204020203" pitchFamily="34" charset="0"/>
+                <a:cs typeface="Segoe UI Semibold" panose="020B0702040204020203" pitchFamily="34" charset="0"/>
+              </a:rPr>
+              <a:t>Overview</a:t>
+            </a:r>
+          </a:p>
+        </p:txBody>
+      </p:sp>
+      <p:sp>
+        <p:nvSpPr>
+          <p:cNvPr id="2" name="Rectangle: Rounded Corners 1">
+            <a:extLst>
+              <a:ext uri="{FF2B5EF4-FFF2-40B4-BE49-F238E27FC236}">
+                <a16:creationId xmlns:a16="http://schemas.microsoft.com/office/drawing/2014/main" id="{0BA7737F-A36F-ACD0-3F8F-3B756F09059A}"/>
+              </a:ext>
+            </a:extLst>
+          </p:cNvPr>
+          <p:cNvSpPr>
+            <a:spLocks/>
+          </p:cNvSpPr>
+          <p:nvPr/>
+        </p:nvSpPr>
+        <p:spPr>
+          <a:xfrm>
+            <a:off x="8385488" y="4301336"/>
+            <a:ext cx="8258786" cy="4431180"/>
           </a:xfrm>
           <a:prstGeom prst="roundRect">
             <a:avLst>
@@ -4438,338 +4652,12 @@
           </a:p>
         </p:txBody>
       </p:sp>
-      <p:sp>
-        <p:nvSpPr>
-          <p:cNvPr id="22" name="Rectangle: Rounded Corners 21">
+      <p:cxnSp>
+        <p:nvCxnSpPr>
+          <p:cNvPr id="8" name="Straight Arrow Connector 7">
             <a:extLst>
               <a:ext uri="{FF2B5EF4-FFF2-40B4-BE49-F238E27FC236}">
-                <a16:creationId xmlns:a16="http://schemas.microsoft.com/office/drawing/2014/main" id="{855EFD4B-B32B-A21E-C64F-E24274CB5318}"/>
-              </a:ext>
-            </a:extLst>
-          </p:cNvPr>
-          <p:cNvSpPr>
-            <a:spLocks/>
-          </p:cNvSpPr>
-          <p:nvPr/>
-        </p:nvSpPr>
-        <p:spPr>
-          <a:xfrm>
-            <a:off x="12420543" y="1393035"/>
-            <a:ext cx="4192266" cy="3474720"/>
-          </a:xfrm>
-          <a:prstGeom prst="roundRect">
-            <a:avLst>
-              <a:gd name="adj" fmla="val 2037"/>
-            </a:avLst>
-          </a:prstGeom>
-          <a:solidFill>
-            <a:schemeClr val="bg1"/>
-          </a:solidFill>
-          <a:ln>
-            <a:noFill/>
-          </a:ln>
-          <a:effectLst>
-            <a:outerShdw blurRad="50800" dist="50800" dir="5400000" sx="102000" sy="102000" algn="ctr" rotWithShape="0">
-              <a:srgbClr val="000000">
-                <a:alpha val="10000"/>
-              </a:srgbClr>
-            </a:outerShdw>
-          </a:effectLst>
-        </p:spPr>
-        <p:style>
-          <a:lnRef idx="2">
-            <a:schemeClr val="accent1">
-              <a:shade val="15000"/>
-            </a:schemeClr>
-          </a:lnRef>
-          <a:fillRef idx="1">
-            <a:schemeClr val="accent1"/>
-          </a:fillRef>
-          <a:effectRef idx="0">
-            <a:schemeClr val="accent1"/>
-          </a:effectRef>
-          <a:fontRef idx="minor">
-            <a:schemeClr val="lt1"/>
-          </a:fontRef>
-        </p:style>
-        <p:txBody>
-          <a:bodyPr rtlCol="0" anchor="ctr"/>
-          <a:lstStyle/>
-          <a:p>
-            <a:endParaRPr lang="en-US" sz="3200" b="1">
-              <a:solidFill>
-                <a:schemeClr val="tx1"/>
-              </a:solidFill>
-              <a:latin typeface="Segoe UI Variable Text" pitchFamily="2" charset="0"/>
-              <a:ea typeface="Segoe UI Black" panose="020B0A02040204020203" pitchFamily="34" charset="0"/>
-              <a:cs typeface="Segoe UI Semibold" panose="020B0702040204020203" pitchFamily="34" charset="0"/>
-            </a:endParaRPr>
-          </a:p>
-        </p:txBody>
-      </p:sp>
-      <p:sp>
-        <p:nvSpPr>
-          <p:cNvPr id="25" name="Rectangle: Rounded Corners 24">
-            <a:extLst>
-              <a:ext uri="{FF2B5EF4-FFF2-40B4-BE49-F238E27FC236}">
-                <a16:creationId xmlns:a16="http://schemas.microsoft.com/office/drawing/2014/main" id="{633DD2B5-B5C4-80C1-E98D-F040032BFEB1}"/>
-              </a:ext>
-            </a:extLst>
-          </p:cNvPr>
-          <p:cNvSpPr>
-            <a:spLocks/>
-          </p:cNvSpPr>
-          <p:nvPr/>
-        </p:nvSpPr>
-        <p:spPr>
-          <a:xfrm>
-            <a:off x="12420543" y="5257796"/>
-            <a:ext cx="4192266" cy="3474720"/>
-          </a:xfrm>
-          <a:prstGeom prst="roundRect">
-            <a:avLst>
-              <a:gd name="adj" fmla="val 2037"/>
-            </a:avLst>
-          </a:prstGeom>
-          <a:solidFill>
-            <a:schemeClr val="bg1"/>
-          </a:solidFill>
-          <a:ln>
-            <a:noFill/>
-          </a:ln>
-          <a:effectLst>
-            <a:outerShdw blurRad="50800" dist="50800" dir="5400000" sx="102000" sy="102000" algn="ctr" rotWithShape="0">
-              <a:srgbClr val="000000">
-                <a:alpha val="10000"/>
-              </a:srgbClr>
-            </a:outerShdw>
-          </a:effectLst>
-        </p:spPr>
-        <p:style>
-          <a:lnRef idx="2">
-            <a:schemeClr val="accent1">
-              <a:shade val="15000"/>
-            </a:schemeClr>
-          </a:lnRef>
-          <a:fillRef idx="1">
-            <a:schemeClr val="accent1"/>
-          </a:fillRef>
-          <a:effectRef idx="0">
-            <a:schemeClr val="accent1"/>
-          </a:effectRef>
-          <a:fontRef idx="minor">
-            <a:schemeClr val="lt1"/>
-          </a:fontRef>
-        </p:style>
-        <p:txBody>
-          <a:bodyPr rtlCol="0" anchor="ctr"/>
-          <a:lstStyle/>
-          <a:p>
-            <a:endParaRPr lang="en-US" sz="3200" b="1" dirty="0">
-              <a:solidFill>
-                <a:schemeClr val="tx1"/>
-              </a:solidFill>
-              <a:latin typeface="Segoe UI Variable Text" pitchFamily="2" charset="0"/>
-              <a:ea typeface="Segoe UI Black" panose="020B0A02040204020203" pitchFamily="34" charset="0"/>
-              <a:cs typeface="Segoe UI Semibold" panose="020B0702040204020203" pitchFamily="34" charset="0"/>
-            </a:endParaRPr>
-          </a:p>
-        </p:txBody>
-      </p:sp>
-      <p:sp>
-        <p:nvSpPr>
-          <p:cNvPr id="19" name="Rectangle 18" hidden="1">
-            <a:extLst>
-              <a:ext uri="{FF2B5EF4-FFF2-40B4-BE49-F238E27FC236}">
-                <a16:creationId xmlns:a16="http://schemas.microsoft.com/office/drawing/2014/main" id="{FD0C806B-82B3-DEAB-C2F8-313624EA9529}"/>
-              </a:ext>
-            </a:extLst>
-          </p:cNvPr>
-          <p:cNvSpPr>
-            <a:spLocks/>
-          </p:cNvSpPr>
-          <p:nvPr/>
-        </p:nvSpPr>
-        <p:spPr>
-          <a:xfrm>
-            <a:off x="7994921" y="0"/>
-            <a:ext cx="356616" cy="9144000"/>
-          </a:xfrm>
-          <a:prstGeom prst="rect">
-            <a:avLst/>
-          </a:prstGeom>
-          <a:solidFill>
-            <a:srgbClr val="C00000"/>
-          </a:solidFill>
-          <a:ln>
-            <a:solidFill>
-              <a:schemeClr val="tx1"/>
-            </a:solidFill>
-          </a:ln>
-        </p:spPr>
-        <p:style>
-          <a:lnRef idx="2">
-            <a:schemeClr val="accent1">
-              <a:shade val="15000"/>
-            </a:schemeClr>
-          </a:lnRef>
-          <a:fillRef idx="1">
-            <a:schemeClr val="accent1"/>
-          </a:fillRef>
-          <a:effectRef idx="0">
-            <a:schemeClr val="accent1"/>
-          </a:effectRef>
-          <a:fontRef idx="minor">
-            <a:schemeClr val="lt1"/>
-          </a:fontRef>
-        </p:style>
-        <p:txBody>
-          <a:bodyPr rtlCol="0" anchor="ctr"/>
-          <a:lstStyle/>
-          <a:p>
-            <a:endParaRPr lang="en-US" sz="3200" b="1">
-              <a:solidFill>
-                <a:schemeClr val="tx1"/>
-              </a:solidFill>
-              <a:latin typeface="Segoe UI Variable Text" pitchFamily="2" charset="0"/>
-              <a:ea typeface="Segoe UI Black" panose="020B0A02040204020203" pitchFamily="34" charset="0"/>
-              <a:cs typeface="Segoe UI Semibold" panose="020B0702040204020203" pitchFamily="34" charset="0"/>
-            </a:endParaRPr>
-          </a:p>
-        </p:txBody>
-      </p:sp>
-      <p:sp>
-        <p:nvSpPr>
-          <p:cNvPr id="39" name="Rectangle 38" hidden="1">
-            <a:extLst>
-              <a:ext uri="{FF2B5EF4-FFF2-40B4-BE49-F238E27FC236}">
-                <a16:creationId xmlns:a16="http://schemas.microsoft.com/office/drawing/2014/main" id="{869A89D8-FE3D-EE6C-68C0-ACE2B031CE05}"/>
-              </a:ext>
-            </a:extLst>
-          </p:cNvPr>
-          <p:cNvSpPr>
-            <a:spLocks/>
-          </p:cNvSpPr>
-          <p:nvPr/>
-        </p:nvSpPr>
-        <p:spPr>
-          <a:xfrm>
-            <a:off x="12056609" y="0"/>
-            <a:ext cx="356616" cy="9144000"/>
-          </a:xfrm>
-          <a:prstGeom prst="rect">
-            <a:avLst/>
-          </a:prstGeom>
-          <a:solidFill>
-            <a:srgbClr val="C00000"/>
-          </a:solidFill>
-          <a:ln>
-            <a:solidFill>
-              <a:schemeClr val="tx1"/>
-            </a:solidFill>
-          </a:ln>
-        </p:spPr>
-        <p:style>
-          <a:lnRef idx="2">
-            <a:schemeClr val="accent1">
-              <a:shade val="15000"/>
-            </a:schemeClr>
-          </a:lnRef>
-          <a:fillRef idx="1">
-            <a:schemeClr val="accent1"/>
-          </a:fillRef>
-          <a:effectRef idx="0">
-            <a:schemeClr val="accent1"/>
-          </a:effectRef>
-          <a:fontRef idx="minor">
-            <a:schemeClr val="lt1"/>
-          </a:fontRef>
-        </p:style>
-        <p:txBody>
-          <a:bodyPr rtlCol="0" anchor="ctr"/>
-          <a:lstStyle/>
-          <a:p>
-            <a:endParaRPr lang="en-US" sz="3200" b="1">
-              <a:solidFill>
-                <a:schemeClr val="tx1"/>
-              </a:solidFill>
-              <a:latin typeface="Segoe UI Variable Text" pitchFamily="2" charset="0"/>
-              <a:ea typeface="Segoe UI Black" panose="020B0A02040204020203" pitchFamily="34" charset="0"/>
-              <a:cs typeface="Segoe UI Semibold" panose="020B0702040204020203" pitchFamily="34" charset="0"/>
-            </a:endParaRPr>
-          </a:p>
-        </p:txBody>
-      </p:sp>
-      <p:sp>
-        <p:nvSpPr>
-          <p:cNvPr id="40" name="Rectangle 39">
-            <a:extLst>
-              <a:ext uri="{FF2B5EF4-FFF2-40B4-BE49-F238E27FC236}">
-                <a16:creationId xmlns:a16="http://schemas.microsoft.com/office/drawing/2014/main" id="{D7892DCC-7549-B044-3D30-C3B66FC5FA54}"/>
-              </a:ext>
-            </a:extLst>
-          </p:cNvPr>
-          <p:cNvSpPr/>
-          <p:nvPr/>
-        </p:nvSpPr>
-        <p:spPr>
-          <a:xfrm>
-            <a:off x="2961558" y="1393035"/>
-            <a:ext cx="4989753" cy="566394"/>
-          </a:xfrm>
-          <a:prstGeom prst="rect">
-            <a:avLst/>
-          </a:prstGeom>
-          <a:noFill/>
-          <a:ln>
-            <a:noFill/>
-          </a:ln>
-        </p:spPr>
-        <p:style>
-          <a:lnRef idx="2">
-            <a:schemeClr val="accent1">
-              <a:shade val="15000"/>
-            </a:schemeClr>
-          </a:lnRef>
-          <a:fillRef idx="1">
-            <a:schemeClr val="accent1"/>
-          </a:fillRef>
-          <a:effectRef idx="0">
-            <a:schemeClr val="accent1"/>
-          </a:effectRef>
-          <a:fontRef idx="minor">
-            <a:schemeClr val="lt1"/>
-          </a:fontRef>
-        </p:style>
-        <p:txBody>
-          <a:bodyPr rtlCol="0" anchor="ctr"/>
-          <a:lstStyle/>
-          <a:p>
-            <a:pPr>
-              <a:lnSpc>
-                <a:spcPts val="3000"/>
-              </a:lnSpc>
-            </a:pPr>
-            <a:r>
-              <a:rPr lang="en-US" b="1" dirty="0">
-                <a:solidFill>
-                  <a:schemeClr val="tx1"/>
-                </a:solidFill>
-                <a:latin typeface="Segoe UI Variable Display Semib" pitchFamily="2" charset="0"/>
-                <a:ea typeface="Segoe UI Black" panose="020B0A02040204020203" pitchFamily="34" charset="0"/>
-                <a:cs typeface="Segoe UI Semibold" panose="020B0702040204020203" pitchFamily="34" charset="0"/>
-              </a:rPr>
-              <a:t>Overview</a:t>
-            </a:r>
-          </a:p>
-        </p:txBody>
-      </p:sp>
-      <p:cxnSp>
-        <p:nvCxnSpPr>
-          <p:cNvPr id="41" name="Straight Arrow Connector 40" hidden="1">
-            <a:extLst>
-              <a:ext uri="{FF2B5EF4-FFF2-40B4-BE49-F238E27FC236}">
-                <a16:creationId xmlns:a16="http://schemas.microsoft.com/office/drawing/2014/main" id="{48C8B39B-2980-A089-D915-6BB29D48FB89}"/>
+                <a16:creationId xmlns:a16="http://schemas.microsoft.com/office/drawing/2014/main" id="{DE85CCF1-E8FB-FB87-5802-2541254A1DD7}"/>
               </a:ext>
             </a:extLst>
           </p:cNvPr>
@@ -4779,63 +4667,30 @@
           <p:nvPr/>
         </p:nvCxnSpPr>
         <p:spPr>
-          <a:xfrm>
-            <a:off x="2964099" y="1959429"/>
-            <a:ext cx="0" cy="1205943"/>
+          <a:xfrm flipH="1">
+            <a:off x="2961558" y="3224550"/>
+            <a:ext cx="4732211" cy="0"/>
           </a:xfrm>
           <a:prstGeom prst="straightConnector1">
             <a:avLst/>
           </a:prstGeom>
-          <a:ln/>
+          <a:ln w="25400">
+            <a:solidFill>
+              <a:schemeClr val="bg1">
+                <a:lumMod val="85000"/>
+              </a:schemeClr>
+            </a:solidFill>
+          </a:ln>
         </p:spPr>
         <p:style>
-          <a:lnRef idx="1">
-            <a:schemeClr val="dk1"/>
+          <a:lnRef idx="2">
+            <a:schemeClr val="accent1"/>
           </a:lnRef>
           <a:fillRef idx="0">
-            <a:schemeClr val="dk1"/>
+            <a:schemeClr val="accent1"/>
           </a:fillRef>
-          <a:effectRef idx="0">
-            <a:schemeClr val="dk1"/>
-          </a:effectRef>
-          <a:fontRef idx="minor">
-            <a:schemeClr val="tx1"/>
-          </a:fontRef>
-        </p:style>
-      </p:cxnSp>
-      <p:cxnSp>
-        <p:nvCxnSpPr>
-          <p:cNvPr id="44" name="Straight Arrow Connector 43" hidden="1">
-            <a:extLst>
-              <a:ext uri="{FF2B5EF4-FFF2-40B4-BE49-F238E27FC236}">
-                <a16:creationId xmlns:a16="http://schemas.microsoft.com/office/drawing/2014/main" id="{95B18635-7AB6-CF99-20D2-B70800653C63}"/>
-              </a:ext>
-            </a:extLst>
-          </p:cNvPr>
-          <p:cNvCxnSpPr>
-            <a:cxnSpLocks/>
-          </p:cNvCxnSpPr>
-          <p:nvPr/>
-        </p:nvCxnSpPr>
-        <p:spPr>
-          <a:xfrm>
-            <a:off x="7699461" y="1959429"/>
-            <a:ext cx="0" cy="1205943"/>
-          </a:xfrm>
-          <a:prstGeom prst="straightConnector1">
-            <a:avLst/>
-          </a:prstGeom>
-          <a:ln/>
-        </p:spPr>
-        <p:style>
-          <a:lnRef idx="1">
-            <a:schemeClr val="dk1"/>
-          </a:lnRef>
-          <a:fillRef idx="0">
-            <a:schemeClr val="dk1"/>
-          </a:fillRef>
-          <a:effectRef idx="0">
-            <a:schemeClr val="dk1"/>
+          <a:effectRef idx="1">
+            <a:schemeClr val="accent1"/>
           </a:effectRef>
           <a:fontRef idx="minor">
             <a:schemeClr val="tx1"/>

</xml_diff>